<commit_message>
Fix token compatibility between lib/ and renderer/ systems
- Update tokens.json: make colors.accent an object with green/greenLight/greenPale
- Add colors.neutral.* (white, pale, light, gray, dark) for lib/ compatibility
- Add typography.family, typography.fallback, typography.scale for lib/
- Add borders.radius and borders.width for lib/
- Update components.json: use @colors.accent.green instead of @colors.accent
- Update lib/svg-generator.js: use colors.accent.green

Both systems now work:
- lib/ + cli.js: node cli.js build-all (9 files, 0 errors)
- renderer/: npm run generate (double-diamond outputs)
</commit_message>
<xml_diff>
--- a/hlv-asset-system/dist/pptx/simple-flow-example.pptx
+++ b/hlv-asset-system/dist/pptx/simple-flow-example.pptx
@@ -1138,11 +1138,11 @@
             </a:avLst>
           </a:prstGeom>
           <a:solidFill>
-            <a:srgbClr val="ECFDF5"/>
+            <a:srgbClr val="F0FDF4"/>
           </a:solidFill>
           <a:ln w="25400">
             <a:solidFill>
-              <a:srgbClr val="00D866"/>
+              <a:srgbClr val="22C55E"/>
             </a:solidFill>
             <a:prstDash val="solid"/>
           </a:ln>
@@ -1325,7 +1325,7 @@
             <a:r>
               <a:rPr lang="en-US" sz="900" dirty="0">
                 <a:solidFill>
-                  <a:srgbClr val="00D866"/>
+                  <a:srgbClr val="000000"/>
                 </a:solidFill>
                 <a:latin typeface="Manrope" pitchFamily="34" charset="0"/>
                 <a:ea typeface="Manrope" pitchFamily="34" charset="-122"/>

</xml_diff>